<commit_message>
Adding table schema, ERD and updated Jupyter Notebook script.
</commit_message>
<xml_diff>
--- a/13-project-2/Project_2.pptx
+++ b/13-project-2/Project_2.pptx
@@ -364,7 +364,7 @@
           <a:p>
             <a:fld id="{88D38747-4367-4BD2-8D51-C97E202738E2}" type="datetime1">
               <a:rPr lang="en-US" smtClean="0"/>
-              <a:t>2/8/2022</a:t>
+              <a:t>2/8/22</a:t>
             </a:fld>
             <a:endParaRPr lang="en-US" dirty="0"/>
           </a:p>
@@ -700,7 +700,7 @@
           <a:p>
             <a:fld id="{217E833E-1B6D-415F-AD29-75AE8C43BD0D}" type="datetime1">
               <a:rPr lang="en-US" smtClean="0"/>
-              <a:t>2/8/2022</a:t>
+              <a:t>2/8/22</a:t>
             </a:fld>
             <a:endParaRPr lang="en-US" dirty="0"/>
           </a:p>
@@ -1003,7 +1003,7 @@
           <a:p>
             <a:fld id="{8452596F-08A7-4B70-989A-F2B1CF31E66B}" type="datetime1">
               <a:rPr lang="en-US" smtClean="0"/>
-              <a:t>2/8/2022</a:t>
+              <a:t>2/8/22</a:t>
             </a:fld>
             <a:endParaRPr lang="en-US" dirty="0"/>
           </a:p>
@@ -1251,7 +1251,7 @@
           <a:p>
             <a:fld id="{73C55A3C-5767-4844-A0A3-83778C2E5409}" type="datetime1">
               <a:rPr lang="en-US" smtClean="0"/>
-              <a:t>2/8/2022</a:t>
+              <a:t>2/8/22</a:t>
             </a:fld>
             <a:endParaRPr lang="en-US" dirty="0"/>
           </a:p>
@@ -1659,7 +1659,7 @@
           <a:p>
             <a:fld id="{CAE507A8-A5CF-4D38-AB86-7EDDA87A85D4}" type="datetime1">
               <a:rPr lang="en-US" smtClean="0"/>
-              <a:t>2/8/2022</a:t>
+              <a:t>2/8/22</a:t>
             </a:fld>
             <a:endParaRPr lang="en-US" dirty="0"/>
           </a:p>
@@ -1975,7 +1975,7 @@
           <a:p>
             <a:fld id="{BDFCD27C-8599-43EF-BA1D-14DDC1946E06}" type="datetime1">
               <a:rPr lang="en-US" smtClean="0"/>
-              <a:t>2/8/2022</a:t>
+              <a:t>2/8/22</a:t>
             </a:fld>
             <a:endParaRPr lang="en-US" dirty="0"/>
           </a:p>
@@ -2520,7 +2520,7 @@
           <a:p>
             <a:fld id="{073ED0CC-082F-4160-86E5-0D6041F12778}" type="datetime1">
               <a:rPr lang="en-US" smtClean="0"/>
-              <a:t>2/8/2022</a:t>
+              <a:t>2/8/22</a:t>
             </a:fld>
             <a:endParaRPr lang="en-US" dirty="0"/>
           </a:p>
@@ -2717,7 +2717,7 @@
           <a:p>
             <a:fld id="{A143DE9B-B678-4EFB-BB7D-A4370204A0B0}" type="datetime1">
               <a:rPr lang="en-US" smtClean="0"/>
-              <a:t>2/8/2022</a:t>
+              <a:t>2/8/22</a:t>
             </a:fld>
             <a:endParaRPr lang="en-US" dirty="0"/>
           </a:p>
@@ -2931,7 +2931,7 @@
           <a:p>
             <a:fld id="{E68812DA-F765-4142-A6A3-A8ED7235E082}" type="datetime1">
               <a:rPr lang="en-US" smtClean="0"/>
-              <a:t>2/8/2022</a:t>
+              <a:t>2/8/22</a:t>
             </a:fld>
             <a:endParaRPr lang="en-US" dirty="0"/>
           </a:p>
@@ -3301,7 +3301,7 @@
           <a:p>
             <a:fld id="{3E0277FD-7DE6-41D4-930D-AC99F5AFE54E}" type="datetime1">
               <a:rPr lang="en-US" smtClean="0"/>
-              <a:t>2/8/2022</a:t>
+              <a:t>2/8/22</a:t>
             </a:fld>
             <a:endParaRPr lang="en-US" dirty="0"/>
           </a:p>
@@ -3705,7 +3705,7 @@
           <a:p>
             <a:fld id="{9EA15526-7079-4B7B-987C-1B5FAE11A0FF}" type="datetime1">
               <a:rPr lang="en-US" smtClean="0"/>
-              <a:t>2/8/2022</a:t>
+              <a:t>2/8/22</a:t>
             </a:fld>
             <a:endParaRPr lang="en-US" dirty="0"/>
           </a:p>
@@ -4021,7 +4021,7 @@
           <a:p>
             <a:fld id="{073ED0CC-082F-4160-86E5-0D6041F12778}" type="datetime1">
               <a:rPr lang="en-US" smtClean="0"/>
-              <a:t>2/8/2022</a:t>
+              <a:t>2/8/22</a:t>
             </a:fld>
             <a:endParaRPr lang="en-US" dirty="0"/>
           </a:p>
@@ -5349,7 +5349,7 @@
                 <a:ea typeface="Calibri" panose="020F0502020204030204" pitchFamily="34" charset="0"/>
                 <a:cs typeface="Times New Roman" panose="02020603050405020304" pitchFamily="18" charset="0"/>
               </a:rPr>
-              <a:t>Meagan Greenhill </a:t>
+              <a:t>Megan Greenhill </a:t>
             </a:r>
           </a:p>
           <a:p>
@@ -5387,7 +5387,7 @@
                 <a:ea typeface="Calibri" panose="020F0502020204030204" pitchFamily="34" charset="0"/>
                 <a:cs typeface="Times New Roman" panose="02020603050405020304" pitchFamily="18" charset="0"/>
               </a:rPr>
-              <a:t>Jacqueline X   </a:t>
+              <a:t>Jacqueline Xia   </a:t>
             </a:r>
           </a:p>
           <a:p>
@@ -6949,7 +6949,7 @@
                 <a:ea typeface="+mn-ea"/>
                 <a:cs typeface="+mn-cs"/>
               </a:rPr>
-              <a:t>Project Summary</a:t>
+              <a:t>Project Overview</a:t>
             </a:r>
           </a:p>
         </p:txBody>
@@ -9051,10 +9051,10 @@
       </p:sp>
       <p:pic>
         <p:nvPicPr>
-          <p:cNvPr id="3" name="Picture 2">
-            <a:extLst>
-              <a:ext uri="{FF2B5EF4-FFF2-40B4-BE49-F238E27FC236}">
-                <a16:creationId xmlns:a16="http://schemas.microsoft.com/office/drawing/2014/main" id="{9ACE7FB5-494A-45D2-8334-932B5B76F353}"/>
+          <p:cNvPr id="4" name="Picture 3" descr="Text&#10;&#10;Description automatically generated">
+            <a:extLst>
+              <a:ext uri="{FF2B5EF4-FFF2-40B4-BE49-F238E27FC236}">
+                <a16:creationId xmlns:a16="http://schemas.microsoft.com/office/drawing/2014/main" id="{F5271AB6-39C3-634F-B965-AC0D3737A45F}"/>
               </a:ext>
             </a:extLst>
           </p:cNvPr>
@@ -9071,8 +9071,8 @@
         </p:blipFill>
         <p:spPr>
           <a:xfrm>
-            <a:off x="3378631" y="1258465"/>
-            <a:ext cx="5923451" cy="5362346"/>
+            <a:off x="3592809" y="1083365"/>
+            <a:ext cx="5428345" cy="5633964"/>
           </a:xfrm>
           <a:prstGeom prst="rect">
             <a:avLst/>
@@ -9865,7 +9865,7 @@
         <p:spPr>
           <a:xfrm>
             <a:off x="2303558" y="2130609"/>
-            <a:ext cx="8266581" cy="2186432"/>
+            <a:ext cx="8266581" cy="1755545"/>
           </a:xfrm>
           <a:prstGeom prst="rect">
             <a:avLst/>
@@ -9950,26 +9950,7 @@
                 <a:latin typeface="Calibri" panose="020F0502020204030204" pitchFamily="34" charset="0"/>
                 <a:cs typeface="Calibri" panose="020F0502020204030204" pitchFamily="34" charset="0"/>
               </a:rPr>
-              <a:t>The Vaccination and World Population data sets are downloaded from their respective sites using the </a:t>
-            </a:r>
-            <a:r>
-              <a:rPr lang="en-AU" sz="1400" dirty="0">
-                <a:solidFill>
-                  <a:srgbClr val="000000"/>
-                </a:solidFill>
-                <a:effectLst/>
-                <a:latin typeface="Calibri" panose="020F0502020204030204" pitchFamily="34" charset="0"/>
-                <a:ea typeface="Times New Roman" panose="02020603050405020304" pitchFamily="18" charset="0"/>
-                <a:cs typeface="Calibri" panose="020F0502020204030204" pitchFamily="34" charset="0"/>
-              </a:rPr>
-              <a:t>pd.read_csv function</a:t>
-            </a:r>
-            <a:r>
-              <a:rPr lang="en-US" sz="1400" dirty="0">
-                <a:latin typeface="Calibri" panose="020F0502020204030204" pitchFamily="34" charset="0"/>
-                <a:cs typeface="Calibri" panose="020F0502020204030204" pitchFamily="34" charset="0"/>
-              </a:rPr>
-              <a:t>.</a:t>
+              <a:t>The Vaccination and Population data sets are downloaded from their respective sites as CSV files.</a:t>
             </a:r>
             <a:endParaRPr lang="en-AU" sz="1400" dirty="0">
               <a:latin typeface="Calibri" panose="020F0502020204030204" pitchFamily="34" charset="0"/>
@@ -10852,7 +10833,7 @@
                 <a:ea typeface="Calibri" panose="020F0502020204030204" pitchFamily="34" charset="0"/>
                 <a:cs typeface="Times New Roman" panose="02020603050405020304" pitchFamily="18" charset="0"/>
               </a:rPr>
-              <a:t>vaccinated_per_hundred</a:t>
+              <a:t>people_vaccinated_per_hundred</a:t>
             </a:r>
             <a:r>
               <a:rPr lang="en-US" sz="1200" b="1" dirty="0">
@@ -11028,12 +11009,37 @@
             </a:pPr>
             <a:r>
               <a:rPr lang="en-US" sz="1200" b="1" dirty="0" err="1">
+                <a:latin typeface="Calibri" panose="020F0502020204030204" pitchFamily="34" charset="0"/>
+                <a:ea typeface="Calibri" panose="020F0502020204030204" pitchFamily="34" charset="0"/>
+                <a:cs typeface="Times New Roman" panose="02020603050405020304" pitchFamily="18" charset="0"/>
+              </a:rPr>
+              <a:t>n</a:t>
+            </a:r>
+            <a:r>
+              <a:rPr lang="en-US" sz="1200" b="1" dirty="0" err="1">
                 <a:effectLst/>
                 <a:latin typeface="Calibri" panose="020F0502020204030204" pitchFamily="34" charset="0"/>
                 <a:ea typeface="Calibri" panose="020F0502020204030204" pitchFamily="34" charset="0"/>
                 <a:cs typeface="Times New Roman" panose="02020603050405020304" pitchFamily="18" charset="0"/>
               </a:rPr>
-              <a:t>not_fully_vaccinated_per_hundred</a:t>
+              <a:t>ot</a:t>
+            </a:r>
+            <a:r>
+              <a:rPr lang="en-US" sz="1200" b="1" dirty="0" err="1">
+                <a:latin typeface="Calibri" panose="020F0502020204030204" pitchFamily="34" charset="0"/>
+                <a:ea typeface="Calibri" panose="020F0502020204030204" pitchFamily="34" charset="0"/>
+                <a:cs typeface="Times New Roman" panose="02020603050405020304" pitchFamily="18" charset="0"/>
+              </a:rPr>
+              <a:t>_</a:t>
+            </a:r>
+            <a:r>
+              <a:rPr lang="en-US" sz="1200" b="1" dirty="0" err="1">
+                <a:effectLst/>
+                <a:latin typeface="Calibri" panose="020F0502020204030204" pitchFamily="34" charset="0"/>
+                <a:ea typeface="Calibri" panose="020F0502020204030204" pitchFamily="34" charset="0"/>
+                <a:cs typeface="Times New Roman" panose="02020603050405020304" pitchFamily="18" charset="0"/>
+              </a:rPr>
+              <a:t>vaccinated_per_hundred</a:t>
             </a:r>
             <a:r>
               <a:rPr lang="en-US" sz="1200" b="1" dirty="0">
@@ -13415,7 +13421,7 @@
                 <a:ea typeface="Calibri" panose="020F0502020204030204" pitchFamily="34" charset="0"/>
                 <a:cs typeface="Times New Roman" panose="02020603050405020304" pitchFamily="18" charset="0"/>
               </a:rPr>
-              <a:t>Select Australia to check that data is correct. Validate the final data frame against the JHU Dashboard for 06/02/2022.</a:t>
+              <a:t>Select Australia to check that data is correct. Validate the final data frame against the JHU Dashboard for 07/02/2022.</a:t>
             </a:r>
           </a:p>
           <a:p>
@@ -13436,7 +13442,7 @@
                 <a:ea typeface="Calibri" panose="020F0502020204030204" pitchFamily="34" charset="0"/>
                 <a:cs typeface="Times New Roman" panose="02020603050405020304" pitchFamily="18" charset="0"/>
               </a:rPr>
-              <a:t>Both showed Confirmed Cases = 2,704,275 and Deaths = 4,154 for Australia.</a:t>
+              <a:t>Both showed Confirmed Cases = 2,727,260 and Deaths = 4,200 for Australia.</a:t>
             </a:r>
           </a:p>
           <a:p>

</xml_diff>